<commit_message>
added new slide format with picture and text side by side; see #65770
</commit_message>
<xml_diff>
--- a/src/templates/default-black.pptx
+++ b/src/templates/default-black.pptx
@@ -10,7 +10,7 @@
   <p:handoutMasterIdLst>
     <p:handoutMasterId r:id="rId3"/>
   </p:handoutMasterIdLst>
-  <p:sldSz cx="9144000" cy="6858000" type="screen4x3"/>
+  <p:sldSz cx="12192000" cy="6858000"/>
   <p:notesSz cx="6858000" cy="9144000"/>
   <p:defaultTextStyle>
     <a:defPPr>
@@ -107,6 +107,36 @@
       </a:defRPr>
     </a:lvl9pPr>
   </p:defaultTextStyle>
+  <p:extLst>
+    <p:ext uri="{EFAFB233-063F-42B5-8137-9DF3F51BA10A}">
+      <p15:sldGuideLst xmlns:p15="http://schemas.microsoft.com/office/powerpoint/2012/main">
+        <p15:guide id="1" orient="horz" pos="2160" userDrawn="1">
+          <p15:clr>
+            <a:srgbClr val="A4A3A4"/>
+          </p15:clr>
+        </p15:guide>
+        <p15:guide id="2" pos="3840" userDrawn="1">
+          <p15:clr>
+            <a:srgbClr val="A4A3A4"/>
+          </p15:clr>
+        </p15:guide>
+      </p15:sldGuideLst>
+    </p:ext>
+    <p:ext uri="{2D200454-40CA-4A62-9FC3-DE9A4176ACB9}">
+      <p15:notesGuideLst xmlns:p15="http://schemas.microsoft.com/office/powerpoint/2012/main">
+        <p15:guide id="1" orient="horz" pos="2880">
+          <p15:clr>
+            <a:srgbClr val="A4A3A4"/>
+          </p15:clr>
+        </p15:guide>
+        <p15:guide id="2" pos="2160">
+          <p15:clr>
+            <a:srgbClr val="A4A3A4"/>
+          </p15:clr>
+        </p15:guide>
+      </p15:notesGuideLst>
+    </p:ext>
+  </p:extLst>
 </p:presentation>
 </file>
 
@@ -192,7 +222,7 @@
           <a:p>
             <a:fld id="{8B5267AF-DFA3-4050-831C-1828E4462933}" type="datetimeFigureOut">
               <a:rPr lang="de-DE" smtClean="0"/>
-              <a:t>13.12.2016</a:t>
+              <a:t>11.02.2022</a:t>
             </a:fld>
             <a:endParaRPr lang="de-DE"/>
           </a:p>
@@ -357,7 +387,7 @@
           <a:p>
             <a:fld id="{58D7F3E4-10E4-45BE-B404-BBD4DC34AD07}" type="datetimeFigureOut">
               <a:rPr lang="de-DE" smtClean="0"/>
-              <a:t>13.12.2016</a:t>
+              <a:t>11.02.2022</a:t>
             </a:fld>
             <a:endParaRPr lang="de-DE"/>
           </a:p>
@@ -375,8 +405,8 @@
         </p:nvSpPr>
         <p:spPr>
           <a:xfrm>
-            <a:off x="1143000" y="685800"/>
-            <a:ext cx="4572000" cy="3429000"/>
+            <a:off x="381000" y="685800"/>
+            <a:ext cx="6096000" cy="3429000"/>
           </a:xfrm>
           <a:prstGeom prst="rect">
             <a:avLst/>
@@ -421,38 +451,37 @@
           <a:p>
             <a:pPr lvl="0"/>
             <a:r>
-              <a:rPr lang="de-DE" smtClean="0"/>
+              <a:rPr lang="de-DE"/>
               <a:t>Textmasterformat bearbeiten</a:t>
             </a:r>
           </a:p>
           <a:p>
             <a:pPr lvl="1"/>
             <a:r>
-              <a:rPr lang="de-DE" smtClean="0"/>
+              <a:rPr lang="de-DE"/>
               <a:t>Zweite Ebene</a:t>
             </a:r>
           </a:p>
           <a:p>
             <a:pPr lvl="2"/>
             <a:r>
-              <a:rPr lang="de-DE" smtClean="0"/>
+              <a:rPr lang="de-DE"/>
               <a:t>Dritte Ebene</a:t>
             </a:r>
           </a:p>
           <a:p>
             <a:pPr lvl="3"/>
             <a:r>
-              <a:rPr lang="de-DE" smtClean="0"/>
+              <a:rPr lang="de-DE"/>
               <a:t>Vierte Ebene</a:t>
             </a:r>
           </a:p>
           <a:p>
             <a:pPr lvl="4"/>
             <a:r>
-              <a:rPr lang="de-DE" smtClean="0"/>
+              <a:rPr lang="de-DE"/>
               <a:t>Fünfte Ebene</a:t>
             </a:r>
-            <a:endParaRPr lang="de-DE"/>
           </a:p>
         </p:txBody>
       </p:sp>
@@ -659,8 +688,8 @@
         </p:nvSpPr>
         <p:spPr>
           <a:xfrm>
-            <a:off x="685800" y="197791"/>
-            <a:ext cx="7772400" cy="1470025"/>
+            <a:off x="914400" y="197792"/>
+            <a:ext cx="10363200" cy="1470025"/>
           </a:xfrm>
         </p:spPr>
         <p:txBody>
@@ -668,10 +697,9 @@
           <a:lstStyle/>
           <a:p>
             <a:r>
-              <a:rPr lang="en-US" dirty="0" smtClean="0"/>
+              <a:rPr lang="en-US" dirty="0"/>
               <a:t>Click to edit Master title style</a:t>
             </a:r>
-            <a:endParaRPr lang="en-US" dirty="0"/>
           </a:p>
         </p:txBody>
       </p:sp>
@@ -687,8 +715,8 @@
         </p:nvSpPr>
         <p:spPr>
           <a:xfrm>
-            <a:off x="1371600" y="1869260"/>
-            <a:ext cx="6400800" cy="3769540"/>
+            <a:off x="1828800" y="1869260"/>
+            <a:ext cx="8534400" cy="3769540"/>
           </a:xfrm>
         </p:spPr>
         <p:txBody>
@@ -787,10 +815,9 @@
           </a:lstStyle>
           <a:p>
             <a:r>
-              <a:rPr lang="en-US" dirty="0" smtClean="0"/>
+              <a:rPr lang="en-US" dirty="0"/>
               <a:t>Click to edit Master subtitle style</a:t>
             </a:r>
-            <a:endParaRPr lang="en-US" dirty="0"/>
           </a:p>
         </p:txBody>
       </p:sp>
@@ -811,7 +838,7 @@
           <a:p>
             <a:fld id="{5BCAD085-E8A6-8845-BD4E-CB4CCA059FC4}" type="datetimeFigureOut">
               <a:rPr lang="en-US" smtClean="0"/>
-              <a:t>12/13/2016</a:t>
+              <a:t>2/11/2022</a:t>
             </a:fld>
             <a:endParaRPr lang="en-US"/>
           </a:p>
@@ -869,13 +896,6 @@
   <p:clrMapOvr>
     <a:overrideClrMapping bg1="dk1" tx1="lt1" bg2="dk2" tx2="lt2" accent1="accent1" accent2="accent2" accent3="accent3" accent4="accent4" accent5="accent5" accent6="accent6" hlink="hlink" folHlink="folHlink"/>
   </p:clrMapOvr>
-  <p:timing>
-    <p:tnLst>
-      <p:par>
-        <p:cTn id="1" dur="indefinite" restart="never" nodeType="tmRoot"/>
-      </p:par>
-    </p:tnLst>
-  </p:timing>
 </p:sldLayout>
 </file>
 
@@ -913,7 +933,7 @@
           <a:p>
             <a:fld id="{5BCAD085-E8A6-8845-BD4E-CB4CCA059FC4}" type="datetimeFigureOut">
               <a:rPr lang="en-US" smtClean="0"/>
-              <a:t>12/13/2016</a:t>
+              <a:t>2/11/2022</a:t>
             </a:fld>
             <a:endParaRPr lang="en-US"/>
           </a:p>
@@ -973,8 +993,8 @@
         </p:nvSpPr>
         <p:spPr>
           <a:xfrm>
-            <a:off x="457200" y="347956"/>
-            <a:ext cx="8229600" cy="5818173"/>
+            <a:off x="609600" y="347957"/>
+            <a:ext cx="10972800" cy="5818173"/>
           </a:xfrm>
         </p:spPr>
         <p:txBody>
@@ -995,13 +1015,6 @@
   <p:clrMapOvr>
     <a:masterClrMapping/>
   </p:clrMapOvr>
-  <p:timing>
-    <p:tnLst>
-      <p:par>
-        <p:cTn id="1" dur="indefinite" restart="never" nodeType="tmRoot"/>
-      </p:par>
-    </p:tnLst>
-  </p:timing>
 </p:sldLayout>
 </file>
 
@@ -1039,7 +1052,7 @@
           <a:p>
             <a:fld id="{5BCAD085-E8A6-8845-BD4E-CB4CCA059FC4}" type="datetimeFigureOut">
               <a:rPr lang="en-US" smtClean="0"/>
-              <a:t>12/13/2016</a:t>
+              <a:t>2/11/2022</a:t>
             </a:fld>
             <a:endParaRPr lang="en-US"/>
           </a:p>
@@ -1099,8 +1112,8 @@
         </p:nvSpPr>
         <p:spPr>
           <a:xfrm>
-            <a:off x="457200" y="315589"/>
-            <a:ext cx="8229600" cy="5008969"/>
+            <a:off x="609600" y="315590"/>
+            <a:ext cx="10972800" cy="5008969"/>
           </a:xfrm>
         </p:spPr>
         <p:txBody>
@@ -1123,8 +1136,8 @@
         </p:nvSpPr>
         <p:spPr>
           <a:xfrm>
-            <a:off x="457200" y="5324558"/>
-            <a:ext cx="8229600" cy="914400"/>
+            <a:off x="609600" y="5324558"/>
+            <a:ext cx="10972800" cy="914400"/>
           </a:xfrm>
         </p:spPr>
         <p:txBody>
@@ -1146,13 +1159,6 @@
   <p:clrMapOvr>
     <a:masterClrMapping/>
   </p:clrMapOvr>
-  <p:timing>
-    <p:tnLst>
-      <p:par>
-        <p:cTn id="1" dur="indefinite" restart="never" nodeType="tmRoot"/>
-      </p:par>
-    </p:tnLst>
-  </p:timing>
 </p:sldLayout>
 </file>
 
@@ -1185,8 +1191,8 @@
         </p:nvSpPr>
         <p:spPr>
           <a:xfrm>
-            <a:off x="457200" y="452438"/>
-            <a:ext cx="4040188" cy="5673725"/>
+            <a:off x="609600" y="452439"/>
+            <a:ext cx="5386917" cy="5673725"/>
           </a:xfrm>
         </p:spPr>
         <p:txBody>
@@ -1209,8 +1215,8 @@
         </p:nvSpPr>
         <p:spPr>
           <a:xfrm>
-            <a:off x="4649788" y="452438"/>
-            <a:ext cx="4040188" cy="5673725"/>
+            <a:off x="6199718" y="452439"/>
+            <a:ext cx="5386917" cy="5673725"/>
           </a:xfrm>
         </p:spPr>
         <p:txBody>
@@ -1238,7 +1244,7 @@
           <a:p>
             <a:fld id="{5BCAD085-E8A6-8845-BD4E-CB4CCA059FC4}" type="datetimeFigureOut">
               <a:rPr lang="en-US" smtClean="0"/>
-              <a:t>12/13/2016</a:t>
+              <a:t>2/11/2022</a:t>
             </a:fld>
             <a:endParaRPr lang="en-US"/>
           </a:p>
@@ -1296,13 +1302,6 @@
   <p:clrMapOvr>
     <a:masterClrMapping/>
   </p:clrMapOvr>
-  <p:timing>
-    <p:tnLst>
-      <p:par>
-        <p:cTn id="1" dur="indefinite" restart="never" nodeType="tmRoot"/>
-      </p:par>
-    </p:tnLst>
-  </p:timing>
 </p:sldLayout>
 </file>
 
@@ -1335,8 +1334,8 @@
         </p:nvSpPr>
         <p:spPr>
           <a:xfrm>
-            <a:off x="457200" y="323850"/>
-            <a:ext cx="4040188" cy="4936634"/>
+            <a:off x="609600" y="323850"/>
+            <a:ext cx="5386917" cy="4936634"/>
           </a:xfrm>
         </p:spPr>
         <p:txBody>
@@ -1359,8 +1358,8 @@
         </p:nvSpPr>
         <p:spPr>
           <a:xfrm>
-            <a:off x="4646612" y="323850"/>
-            <a:ext cx="4040188" cy="4936634"/>
+            <a:off x="6195483" y="323850"/>
+            <a:ext cx="5386917" cy="4936634"/>
           </a:xfrm>
         </p:spPr>
         <p:txBody>
@@ -1388,7 +1387,7 @@
           <a:p>
             <a:fld id="{5BCAD085-E8A6-8845-BD4E-CB4CCA059FC4}" type="datetimeFigureOut">
               <a:rPr lang="en-US" smtClean="0"/>
-              <a:t>12/13/2016</a:t>
+              <a:t>2/11/2022</a:t>
             </a:fld>
             <a:endParaRPr lang="en-US"/>
           </a:p>
@@ -1448,8 +1447,8 @@
         </p:nvSpPr>
         <p:spPr>
           <a:xfrm>
-            <a:off x="457200" y="5421791"/>
-            <a:ext cx="4040188" cy="720725"/>
+            <a:off x="609600" y="5421792"/>
+            <a:ext cx="5386917" cy="720725"/>
           </a:xfrm>
         </p:spPr>
         <p:txBody>
@@ -1473,8 +1472,8 @@
         </p:nvSpPr>
         <p:spPr>
           <a:xfrm>
-            <a:off x="4649788" y="5421791"/>
-            <a:ext cx="4040188" cy="720725"/>
+            <a:off x="6199718" y="5421792"/>
+            <a:ext cx="5386917" cy="720725"/>
           </a:xfrm>
         </p:spPr>
         <p:txBody>
@@ -1496,13 +1495,6 @@
   <p:clrMapOvr>
     <a:masterClrMapping/>
   </p:clrMapOvr>
-  <p:timing>
-    <p:tnLst>
-      <p:par>
-        <p:cTn id="1" dur="indefinite" restart="never" nodeType="tmRoot"/>
-      </p:par>
-    </p:tnLst>
-  </p:timing>
 </p:sldLayout>
 </file>
 
@@ -1540,8 +1532,8 @@
         </p:nvSpPr>
         <p:spPr>
           <a:xfrm>
-            <a:off x="685800" y="197792"/>
-            <a:ext cx="7772400" cy="668056"/>
+            <a:off x="914400" y="197792"/>
+            <a:ext cx="10363200" cy="668056"/>
           </a:xfrm>
         </p:spPr>
         <p:txBody>
@@ -1549,10 +1541,9 @@
           <a:lstStyle/>
           <a:p>
             <a:r>
-              <a:rPr lang="en-US" dirty="0" smtClean="0"/>
+              <a:rPr lang="en-US" dirty="0"/>
               <a:t>Click to edit Master title style</a:t>
             </a:r>
-            <a:endParaRPr lang="en-US" dirty="0"/>
           </a:p>
         </p:txBody>
       </p:sp>
@@ -1568,8 +1559,8 @@
         </p:nvSpPr>
         <p:spPr>
           <a:xfrm>
-            <a:off x="685800" y="979137"/>
-            <a:ext cx="7772400" cy="4928050"/>
+            <a:off x="914400" y="979137"/>
+            <a:ext cx="10363200" cy="4928050"/>
           </a:xfrm>
         </p:spPr>
         <p:txBody>
@@ -1591,13 +1582,6 @@
   <p:clrMapOvr>
     <a:overrideClrMapping bg1="dk1" tx1="lt1" bg2="dk2" tx2="lt2" accent1="accent1" accent2="accent2" accent3="accent3" accent4="accent4" accent5="accent5" accent6="accent6" hlink="hlink" folHlink="folHlink"/>
   </p:clrMapOvr>
-  <p:timing>
-    <p:tnLst>
-      <p:par>
-        <p:cTn id="1" dur="indefinite" restart="never" nodeType="tmRoot"/>
-      </p:par>
-    </p:tnLst>
-  </p:timing>
 </p:sldLayout>
 </file>
 
@@ -1635,8 +1619,8 @@
         </p:nvSpPr>
         <p:spPr>
           <a:xfrm>
-            <a:off x="457200" y="274638"/>
-            <a:ext cx="8229600" cy="1143000"/>
+            <a:off x="609600" y="274638"/>
+            <a:ext cx="10972800" cy="1143000"/>
           </a:xfrm>
           <a:prstGeom prst="rect">
             <a:avLst/>
@@ -1649,10 +1633,9 @@
           <a:lstStyle/>
           <a:p>
             <a:r>
-              <a:rPr lang="en-US" smtClean="0"/>
+              <a:rPr lang="en-US"/>
               <a:t>Click to edit Master title style</a:t>
             </a:r>
-            <a:endParaRPr lang="en-US"/>
           </a:p>
         </p:txBody>
       </p:sp>
@@ -1668,8 +1651,8 @@
         </p:nvSpPr>
         <p:spPr>
           <a:xfrm>
-            <a:off x="457200" y="1600200"/>
-            <a:ext cx="8229600" cy="4525963"/>
+            <a:off x="609600" y="1600201"/>
+            <a:ext cx="10972800" cy="4525963"/>
           </a:xfrm>
           <a:prstGeom prst="rect">
             <a:avLst/>
@@ -1683,38 +1666,37 @@
           <a:p>
             <a:pPr lvl="0"/>
             <a:r>
-              <a:rPr lang="en-US" smtClean="0"/>
+              <a:rPr lang="en-US"/>
               <a:t>Click to edit Master text styles</a:t>
             </a:r>
           </a:p>
           <a:p>
             <a:pPr lvl="1"/>
             <a:r>
-              <a:rPr lang="en-US" smtClean="0"/>
+              <a:rPr lang="en-US"/>
               <a:t>Second level</a:t>
             </a:r>
           </a:p>
           <a:p>
             <a:pPr lvl="2"/>
             <a:r>
-              <a:rPr lang="en-US" smtClean="0"/>
+              <a:rPr lang="en-US"/>
               <a:t>Third level</a:t>
             </a:r>
           </a:p>
           <a:p>
             <a:pPr lvl="3"/>
             <a:r>
-              <a:rPr lang="en-US" smtClean="0"/>
+              <a:rPr lang="en-US"/>
               <a:t>Fourth level</a:t>
             </a:r>
           </a:p>
           <a:p>
             <a:pPr lvl="4"/>
             <a:r>
-              <a:rPr lang="en-US" smtClean="0"/>
+              <a:rPr lang="en-US"/>
               <a:t>Fifth level</a:t>
             </a:r>
-            <a:endParaRPr lang="en-US"/>
           </a:p>
         </p:txBody>
       </p:sp>
@@ -1730,8 +1712,8 @@
         </p:nvSpPr>
         <p:spPr>
           <a:xfrm>
-            <a:off x="457200" y="6356350"/>
-            <a:ext cx="2133600" cy="365125"/>
+            <a:off x="609600" y="6356351"/>
+            <a:ext cx="2844800" cy="365125"/>
           </a:xfrm>
           <a:prstGeom prst="rect">
             <a:avLst/>
@@ -1753,7 +1735,7 @@
           <a:p>
             <a:fld id="{5BCAD085-E8A6-8845-BD4E-CB4CCA059FC4}" type="datetimeFigureOut">
               <a:rPr lang="en-US" smtClean="0"/>
-              <a:t>12/13/2016</a:t>
+              <a:t>2/11/2022</a:t>
             </a:fld>
             <a:endParaRPr lang="en-US"/>
           </a:p>
@@ -1771,8 +1753,8 @@
         </p:nvSpPr>
         <p:spPr>
           <a:xfrm>
-            <a:off x="3124200" y="6356350"/>
-            <a:ext cx="2895600" cy="365125"/>
+            <a:off x="4165600" y="6356351"/>
+            <a:ext cx="3860800" cy="365125"/>
           </a:xfrm>
           <a:prstGeom prst="rect">
             <a:avLst/>
@@ -1808,8 +1790,8 @@
         </p:nvSpPr>
         <p:spPr>
           <a:xfrm>
-            <a:off x="6553200" y="6356350"/>
-            <a:ext cx="2133600" cy="365125"/>
+            <a:off x="8737600" y="6356351"/>
+            <a:ext cx="2844800" cy="365125"/>
           </a:xfrm>
           <a:prstGeom prst="rect">
             <a:avLst/>
@@ -1853,13 +1835,6 @@
     <p:sldLayoutId id="2147483655" r:id="rId5"/>
     <p:sldLayoutId id="2147483656" r:id="rId6"/>
   </p:sldLayoutIdLst>
-  <p:timing>
-    <p:tnLst>
-      <p:par>
-        <p:cTn id="1" dur="indefinite" restart="never" nodeType="tmRoot"/>
-      </p:par>
-    </p:tnLst>
-  </p:timing>
   <p:txStyles>
     <p:titleStyle>
       <a:lvl1pPr algn="ctr" defTabSz="457200" rtl="0" eaLnBrk="1" latinLnBrk="0" hangingPunct="1">

</xml_diff>